<commit_message>
slide to add to main presentation
</commit_message>
<xml_diff>
--- a/presentation/CaptHook_Presentation_Luc.pptx
+++ b/presentation/CaptHook_Presentation_Luc.pptx
@@ -5,14 +5,7 @@
     <p:sldMasterId id="2147483648" r:id="rId1"/>
   </p:sldMasterIdLst>
   <p:sldIdLst>
-    <p:sldId id="256" r:id="rId2"/>
-    <p:sldId id="257" r:id="rId3"/>
-    <p:sldId id="260" r:id="rId4"/>
-    <p:sldId id="264" r:id="rId5"/>
-    <p:sldId id="261" r:id="rId6"/>
-    <p:sldId id="259" r:id="rId7"/>
-    <p:sldId id="262" r:id="rId8"/>
-    <p:sldId id="263" r:id="rId9"/>
+    <p:sldId id="261" r:id="rId2"/>
   </p:sldIdLst>
   <p:sldSz cx="12192000" cy="6858000"/>
   <p:notesSz cx="6858000" cy="9144000"/>
@@ -2992,285 +2985,6 @@
         </p:blipFill>
         <p:spPr>
           <a:xfrm rot="2732641">
-            <a:off x="1444271" y="3681005"/>
-            <a:ext cx="626332" cy="626332"/>
-          </a:xfrm>
-          <a:prstGeom prst="rect">
-            <a:avLst/>
-          </a:prstGeom>
-        </p:spPr>
-      </p:pic>
-      <p:sp>
-        <p:nvSpPr>
-          <p:cNvPr id="5" name="TextBox 4"/>
-          <p:cNvSpPr txBox="1"/>
-          <p:nvPr/>
-        </p:nvSpPr>
-        <p:spPr>
-          <a:xfrm>
-            <a:off x="1605329" y="1317564"/>
-            <a:ext cx="7937098" cy="1015663"/>
-          </a:xfrm>
-          <a:prstGeom prst="rect">
-            <a:avLst/>
-          </a:prstGeom>
-          <a:noFill/>
-        </p:spPr>
-        <p:txBody>
-          <a:bodyPr wrap="square" rtlCol="0">
-            <a:spAutoFit/>
-          </a:bodyPr>
-          <a:lstStyle/>
-          <a:p>
-            <a:r>
-              <a:rPr lang="en-US" sz="6000" b="1" dirty="0" smtClean="0">
-                <a:latin typeface="Cambria" panose="02040503050406030204" pitchFamily="18" charset="0"/>
-              </a:rPr>
-              <a:t>Capt. Hook</a:t>
-            </a:r>
-          </a:p>
-        </p:txBody>
-      </p:sp>
-      <p:sp>
-        <p:nvSpPr>
-          <p:cNvPr id="7" name="TextBox 6"/>
-          <p:cNvSpPr txBox="1"/>
-          <p:nvPr/>
-        </p:nvSpPr>
-        <p:spPr>
-          <a:xfrm>
-            <a:off x="2194947" y="3716123"/>
-            <a:ext cx="7937098" cy="1938992"/>
-          </a:xfrm>
-          <a:prstGeom prst="rect">
-            <a:avLst/>
-          </a:prstGeom>
-          <a:noFill/>
-        </p:spPr>
-        <p:txBody>
-          <a:bodyPr wrap="square" rtlCol="0">
-            <a:spAutoFit/>
-          </a:bodyPr>
-          <a:lstStyle/>
-          <a:p>
-            <a:r>
-              <a:rPr lang="en-US" sz="2400" b="1" dirty="0" smtClean="0">
-                <a:latin typeface="Cambria" panose="02040503050406030204" pitchFamily="18" charset="0"/>
-              </a:rPr>
-              <a:t>Andrew “</a:t>
-            </a:r>
-            <a:r>
-              <a:rPr lang="en-US" sz="2400" b="1" dirty="0" err="1" smtClean="0">
-                <a:latin typeface="Cambria" panose="02040503050406030204" pitchFamily="18" charset="0"/>
-              </a:rPr>
-              <a:t>Smee</a:t>
-            </a:r>
-            <a:r>
-              <a:rPr lang="en-US" sz="2400" b="1" dirty="0" smtClean="0">
-                <a:latin typeface="Cambria" panose="02040503050406030204" pitchFamily="18" charset="0"/>
-              </a:rPr>
-              <a:t>” </a:t>
-            </a:r>
-            <a:r>
-              <a:rPr lang="en-US" sz="2400" b="1" dirty="0" err="1" smtClean="0">
-                <a:latin typeface="Cambria" panose="02040503050406030204" pitchFamily="18" charset="0"/>
-              </a:rPr>
-              <a:t>Salveson</a:t>
-            </a:r>
-            <a:endParaRPr lang="en-US" sz="2400" b="1" dirty="0" smtClean="0">
-              <a:latin typeface="Cambria" panose="02040503050406030204" pitchFamily="18" charset="0"/>
-            </a:endParaRPr>
-          </a:p>
-          <a:p>
-            <a:endParaRPr lang="en-US" sz="2400" b="1" dirty="0">
-              <a:latin typeface="Cambria" panose="02040503050406030204" pitchFamily="18" charset="0"/>
-            </a:endParaRPr>
-          </a:p>
-          <a:p>
-            <a:r>
-              <a:rPr lang="en-US" sz="2400" b="1" dirty="0" smtClean="0">
-                <a:latin typeface="Cambria" panose="02040503050406030204" pitchFamily="18" charset="0"/>
-              </a:rPr>
-              <a:t>Matthew “</a:t>
-            </a:r>
-            <a:r>
-              <a:rPr lang="en-US" sz="2400" b="1" smtClean="0">
-                <a:latin typeface="Cambria" panose="02040503050406030204" pitchFamily="18" charset="0"/>
-              </a:rPr>
-              <a:t>Lost Boys” Dahlhausen</a:t>
-            </a:r>
-            <a:endParaRPr lang="en-US" sz="2400" b="1" dirty="0" smtClean="0">
-              <a:latin typeface="Cambria" panose="02040503050406030204" pitchFamily="18" charset="0"/>
-            </a:endParaRPr>
-          </a:p>
-          <a:p>
-            <a:endParaRPr lang="en-US" sz="2400" b="1" dirty="0" smtClean="0">
-              <a:latin typeface="Cambria" panose="02040503050406030204" pitchFamily="18" charset="0"/>
-            </a:endParaRPr>
-          </a:p>
-          <a:p>
-            <a:r>
-              <a:rPr lang="en-US" sz="2400" b="1" dirty="0" smtClean="0">
-                <a:latin typeface="Cambria" panose="02040503050406030204" pitchFamily="18" charset="0"/>
-              </a:rPr>
-              <a:t>Luc “Tinkerbell” </a:t>
-            </a:r>
-            <a:r>
-              <a:rPr lang="en-US" sz="2400" b="1" dirty="0" err="1" smtClean="0">
-                <a:latin typeface="Cambria" panose="02040503050406030204" pitchFamily="18" charset="0"/>
-              </a:rPr>
-              <a:t>Deckinga</a:t>
-            </a:r>
-            <a:endParaRPr lang="en-US" sz="2400" b="1" dirty="0">
-              <a:latin typeface="Cambria" panose="02040503050406030204" pitchFamily="18" charset="0"/>
-            </a:endParaRPr>
-          </a:p>
-        </p:txBody>
-      </p:sp>
-      <p:sp>
-        <p:nvSpPr>
-          <p:cNvPr id="8" name="TextBox 7"/>
-          <p:cNvSpPr txBox="1"/>
-          <p:nvPr/>
-        </p:nvSpPr>
-        <p:spPr>
-          <a:xfrm>
-            <a:off x="1605329" y="2662251"/>
-            <a:ext cx="9622304" cy="523220"/>
-          </a:xfrm>
-          <a:prstGeom prst="rect">
-            <a:avLst/>
-          </a:prstGeom>
-          <a:noFill/>
-        </p:spPr>
-        <p:txBody>
-          <a:bodyPr wrap="square" rtlCol="0">
-            <a:spAutoFit/>
-          </a:bodyPr>
-          <a:lstStyle/>
-          <a:p>
-            <a:r>
-              <a:rPr lang="en-US" sz="2800" b="1" i="1" dirty="0" smtClean="0">
-                <a:latin typeface="Cambria" panose="02040503050406030204" pitchFamily="18" charset="0"/>
-              </a:rPr>
-              <a:t>A </a:t>
-            </a:r>
-            <a:r>
-              <a:rPr lang="en-US" sz="2800" b="1" i="1" dirty="0" err="1" smtClean="0">
-                <a:latin typeface="Cambria" panose="02040503050406030204" pitchFamily="18" charset="0"/>
-              </a:rPr>
-              <a:t>git</a:t>
-            </a:r>
-            <a:r>
-              <a:rPr lang="en-US" sz="2800" b="1" i="1" dirty="0" smtClean="0">
-                <a:latin typeface="Cambria" panose="02040503050406030204" pitchFamily="18" charset="0"/>
-              </a:rPr>
-              <a:t>-hook for meaningful file diffs</a:t>
-            </a:r>
-          </a:p>
-        </p:txBody>
-      </p:sp>
-      <p:pic>
-        <p:nvPicPr>
-          <p:cNvPr id="9" name="Picture 8"/>
-          <p:cNvPicPr>
-            <a:picLocks noChangeAspect="1"/>
-          </p:cNvPicPr>
-          <p:nvPr/>
-        </p:nvPicPr>
-        <p:blipFill>
-          <a:blip r:embed="rId2"/>
-          <a:stretch>
-            <a:fillRect/>
-          </a:stretch>
-        </p:blipFill>
-        <p:spPr>
-          <a:xfrm rot="2732641">
-            <a:off x="1438917" y="4337568"/>
-            <a:ext cx="626332" cy="626332"/>
-          </a:xfrm>
-          <a:prstGeom prst="rect">
-            <a:avLst/>
-          </a:prstGeom>
-        </p:spPr>
-      </p:pic>
-      <p:pic>
-        <p:nvPicPr>
-          <p:cNvPr id="10" name="Picture 9"/>
-          <p:cNvPicPr>
-            <a:picLocks noChangeAspect="1"/>
-          </p:cNvPicPr>
-          <p:nvPr/>
-        </p:nvPicPr>
-        <p:blipFill>
-          <a:blip r:embed="rId2"/>
-          <a:stretch>
-            <a:fillRect/>
-          </a:stretch>
-        </p:blipFill>
-        <p:spPr>
-          <a:xfrm rot="2732641">
-            <a:off x="1441594" y="4994128"/>
-            <a:ext cx="626332" cy="626332"/>
-          </a:xfrm>
-          <a:prstGeom prst="rect">
-            <a:avLst/>
-          </a:prstGeom>
-        </p:spPr>
-      </p:pic>
-    </p:spTree>
-    <p:extLst>
-      <p:ext uri="{BB962C8B-B14F-4D97-AF65-F5344CB8AC3E}">
-        <p14:creationId xmlns:p14="http://schemas.microsoft.com/office/powerpoint/2010/main" val="1130167020"/>
-      </p:ext>
-    </p:extLst>
-  </p:cSld>
-  <p:clrMapOvr>
-    <a:masterClrMapping/>
-  </p:clrMapOvr>
-  <p:timing>
-    <p:tnLst>
-      <p:par>
-        <p:cTn id="1" dur="indefinite" restart="never" nodeType="tmRoot"/>
-      </p:par>
-    </p:tnLst>
-  </p:timing>
-</p:sld>
-</file>
-
-<file path=ppt/slides/slide2.xml><?xml version="1.0" encoding="utf-8"?>
-<p:sld xmlns:a="http://schemas.openxmlformats.org/drawingml/2006/main" xmlns:r="http://schemas.openxmlformats.org/officeDocument/2006/relationships" xmlns:p="http://schemas.openxmlformats.org/presentationml/2006/main">
-  <p:cSld>
-    <p:spTree>
-      <p:nvGrpSpPr>
-        <p:cNvPr id="1" name=""/>
-        <p:cNvGrpSpPr/>
-        <p:nvPr/>
-      </p:nvGrpSpPr>
-      <p:grpSpPr>
-        <a:xfrm>
-          <a:off x="0" y="0"/>
-          <a:ext cx="0" cy="0"/>
-          <a:chOff x="0" y="0"/>
-          <a:chExt cx="0" cy="0"/>
-        </a:xfrm>
-      </p:grpSpPr>
-      <p:pic>
-        <p:nvPicPr>
-          <p:cNvPr id="4" name="Picture 3"/>
-          <p:cNvPicPr>
-            <a:picLocks noChangeAspect="1"/>
-          </p:cNvPicPr>
-          <p:nvPr/>
-        </p:nvPicPr>
-        <p:blipFill>
-          <a:blip r:embed="rId2"/>
-          <a:stretch>
-            <a:fillRect/>
-          </a:stretch>
-        </p:blipFill>
-        <p:spPr>
-          <a:xfrm rot="2732641">
             <a:off x="1670100" y="1242369"/>
             <a:ext cx="1334399" cy="1334399"/>
           </a:xfrm>
@@ -3346,759 +3060,6 @@
               <a:rPr lang="en-US" sz="6000" b="1" dirty="0" smtClean="0">
                 <a:latin typeface="Cambria" panose="02040503050406030204" pitchFamily="18" charset="0"/>
               </a:rPr>
-              <a:t>The Problem</a:t>
-            </a:r>
-          </a:p>
-        </p:txBody>
-      </p:sp>
-      <p:pic>
-        <p:nvPicPr>
-          <p:cNvPr id="2" name="Picture 1"/>
-          <p:cNvPicPr>
-            <a:picLocks noChangeAspect="1"/>
-          </p:cNvPicPr>
-          <p:nvPr/>
-        </p:nvPicPr>
-        <p:blipFill>
-          <a:blip r:embed="rId4"/>
-          <a:stretch>
-            <a:fillRect/>
-          </a:stretch>
-        </p:blipFill>
-        <p:spPr>
-          <a:xfrm>
-            <a:off x="268267" y="2787500"/>
-            <a:ext cx="3390900" cy="4010025"/>
-          </a:xfrm>
-          <a:prstGeom prst="rect">
-            <a:avLst/>
-          </a:prstGeom>
-        </p:spPr>
-      </p:pic>
-      <p:pic>
-        <p:nvPicPr>
-          <p:cNvPr id="14" name="Picture 13"/>
-          <p:cNvPicPr>
-            <a:picLocks noChangeAspect="1"/>
-          </p:cNvPicPr>
-          <p:nvPr/>
-        </p:nvPicPr>
-        <p:blipFill>
-          <a:blip r:embed="rId2"/>
-          <a:stretch>
-            <a:fillRect/>
-          </a:stretch>
-        </p:blipFill>
-        <p:spPr>
-          <a:xfrm rot="2732641">
-            <a:off x="3033792" y="1595136"/>
-            <a:ext cx="626332" cy="626332"/>
-          </a:xfrm>
-          <a:prstGeom prst="rect">
-            <a:avLst/>
-          </a:prstGeom>
-        </p:spPr>
-      </p:pic>
-      <p:sp>
-        <p:nvSpPr>
-          <p:cNvPr id="15" name="TextBox 14"/>
-          <p:cNvSpPr txBox="1"/>
-          <p:nvPr/>
-        </p:nvSpPr>
-        <p:spPr>
-          <a:xfrm>
-            <a:off x="3784468" y="1535558"/>
-            <a:ext cx="7937098" cy="1631216"/>
-          </a:xfrm>
-          <a:prstGeom prst="rect">
-            <a:avLst/>
-          </a:prstGeom>
-          <a:noFill/>
-        </p:spPr>
-        <p:txBody>
-          <a:bodyPr wrap="square" rtlCol="0">
-            <a:spAutoFit/>
-          </a:bodyPr>
-          <a:lstStyle/>
-          <a:p>
-            <a:r>
-              <a:rPr lang="en-US" sz="2000" b="1" dirty="0" smtClean="0">
-                <a:latin typeface="Cambria" panose="02040503050406030204" pitchFamily="18" charset="0"/>
-              </a:rPr>
-              <a:t>Versioning software and diffs were written for code, where seeing single line changes are easy to see</a:t>
-            </a:r>
-          </a:p>
-          <a:p>
-            <a:endParaRPr lang="en-US" sz="2000" b="1" dirty="0">
-              <a:latin typeface="Cambria" panose="02040503050406030204" pitchFamily="18" charset="0"/>
-            </a:endParaRPr>
-          </a:p>
-          <a:p>
-            <a:r>
-              <a:rPr lang="en-US" sz="2000" b="1" dirty="0" smtClean="0">
-                <a:latin typeface="Cambria" panose="02040503050406030204" pitchFamily="18" charset="0"/>
-              </a:rPr>
-              <a:t>This isn’t helpful for block text changes (e.g. </a:t>
-            </a:r>
-            <a:r>
-              <a:rPr lang="en-US" sz="2000" b="1" dirty="0" err="1" smtClean="0">
-                <a:latin typeface="Cambria" panose="02040503050406030204" pitchFamily="18" charset="0"/>
-              </a:rPr>
-              <a:t>OpenStudio</a:t>
-            </a:r>
-            <a:r>
-              <a:rPr lang="en-US" sz="2000" b="1" dirty="0" smtClean="0">
-                <a:latin typeface="Cambria" panose="02040503050406030204" pitchFamily="18" charset="0"/>
-              </a:rPr>
-              <a:t> models) or non-text, graphical files (e.g. Grasshopper files)</a:t>
-            </a:r>
-          </a:p>
-        </p:txBody>
-      </p:sp>
-      <p:pic>
-        <p:nvPicPr>
-          <p:cNvPr id="16" name="Picture 15"/>
-          <p:cNvPicPr>
-            <a:picLocks noChangeAspect="1"/>
-          </p:cNvPicPr>
-          <p:nvPr/>
-        </p:nvPicPr>
-        <p:blipFill>
-          <a:blip r:embed="rId2"/>
-          <a:stretch>
-            <a:fillRect/>
-          </a:stretch>
-        </p:blipFill>
-        <p:spPr>
-          <a:xfrm rot="2732641">
-            <a:off x="3028438" y="2251699"/>
-            <a:ext cx="626332" cy="626332"/>
-          </a:xfrm>
-          <a:prstGeom prst="rect">
-            <a:avLst/>
-          </a:prstGeom>
-        </p:spPr>
-      </p:pic>
-      <p:sp>
-        <p:nvSpPr>
-          <p:cNvPr id="21" name="TextBox 20"/>
-          <p:cNvSpPr txBox="1"/>
-          <p:nvPr/>
-        </p:nvSpPr>
-        <p:spPr>
-          <a:xfrm>
-            <a:off x="3784468" y="3753217"/>
-            <a:ext cx="3323698" cy="1015663"/>
-          </a:xfrm>
-          <a:prstGeom prst="rect">
-            <a:avLst/>
-          </a:prstGeom>
-          <a:noFill/>
-        </p:spPr>
-        <p:txBody>
-          <a:bodyPr wrap="square" rtlCol="0">
-            <a:spAutoFit/>
-          </a:bodyPr>
-          <a:lstStyle/>
-          <a:p>
-            <a:r>
-              <a:rPr lang="en-US" sz="2000" b="1" dirty="0" smtClean="0">
-                <a:latin typeface="Cambria" panose="02040503050406030204" pitchFamily="18" charset="0"/>
-              </a:rPr>
-              <a:t>&lt;- </a:t>
-            </a:r>
-            <a:r>
-              <a:rPr lang="en-US" sz="2000" b="1" dirty="0" err="1" smtClean="0">
-                <a:latin typeface="Cambria" panose="02040503050406030204" pitchFamily="18" charset="0"/>
-              </a:rPr>
-              <a:t>Github</a:t>
-            </a:r>
-            <a:r>
-              <a:rPr lang="en-US" sz="2000" b="1" dirty="0" smtClean="0">
-                <a:latin typeface="Cambria" panose="02040503050406030204" pitchFamily="18" charset="0"/>
-              </a:rPr>
-              <a:t> </a:t>
-            </a:r>
-            <a:r>
-              <a:rPr lang="en-US" sz="2000" b="1" dirty="0" err="1" smtClean="0">
-                <a:latin typeface="Cambria" panose="02040503050406030204" pitchFamily="18" charset="0"/>
-              </a:rPr>
-              <a:t>OpenStudio</a:t>
-            </a:r>
-            <a:r>
-              <a:rPr lang="en-US" sz="2000" b="1" dirty="0" smtClean="0">
-                <a:latin typeface="Cambria" panose="02040503050406030204" pitchFamily="18" charset="0"/>
-              </a:rPr>
-              <a:t> diff</a:t>
-            </a:r>
-          </a:p>
-          <a:p>
-            <a:endParaRPr lang="en-US" sz="2000" b="1" dirty="0">
-              <a:latin typeface="Cambria" panose="02040503050406030204" pitchFamily="18" charset="0"/>
-            </a:endParaRPr>
-          </a:p>
-          <a:p>
-            <a:r>
-              <a:rPr lang="en-US" sz="2000" b="1" dirty="0" err="1" smtClean="0">
-                <a:latin typeface="Cambria" panose="02040503050406030204" pitchFamily="18" charset="0"/>
-              </a:rPr>
-              <a:t>Github</a:t>
-            </a:r>
-            <a:r>
-              <a:rPr lang="en-US" sz="2000" b="1" dirty="0" smtClean="0">
-                <a:latin typeface="Cambria" panose="02040503050406030204" pitchFamily="18" charset="0"/>
-              </a:rPr>
-              <a:t> </a:t>
-            </a:r>
-            <a:r>
-              <a:rPr lang="en-US" sz="2000" b="1" dirty="0" err="1" smtClean="0">
-                <a:latin typeface="Cambria" panose="02040503050406030204" pitchFamily="18" charset="0"/>
-              </a:rPr>
-              <a:t>Grassopper</a:t>
-            </a:r>
-            <a:r>
-              <a:rPr lang="en-US" sz="2000" b="1" dirty="0" smtClean="0">
-                <a:latin typeface="Cambria" panose="02040503050406030204" pitchFamily="18" charset="0"/>
-              </a:rPr>
-              <a:t> diff -&gt;</a:t>
-            </a:r>
-          </a:p>
-        </p:txBody>
-      </p:sp>
-    </p:spTree>
-    <p:extLst>
-      <p:ext uri="{BB962C8B-B14F-4D97-AF65-F5344CB8AC3E}">
-        <p14:creationId xmlns:p14="http://schemas.microsoft.com/office/powerpoint/2010/main" val="1310305916"/>
-      </p:ext>
-    </p:extLst>
-  </p:cSld>
-  <p:clrMapOvr>
-    <a:masterClrMapping/>
-  </p:clrMapOvr>
-  <p:timing>
-    <p:tnLst>
-      <p:par>
-        <p:cTn id="1" dur="indefinite" restart="never" nodeType="tmRoot"/>
-      </p:par>
-    </p:tnLst>
-  </p:timing>
-</p:sld>
-</file>
-
-<file path=ppt/slides/slide3.xml><?xml version="1.0" encoding="utf-8"?>
-<p:sld xmlns:a="http://schemas.openxmlformats.org/drawingml/2006/main" xmlns:r="http://schemas.openxmlformats.org/officeDocument/2006/relationships" xmlns:p="http://schemas.openxmlformats.org/presentationml/2006/main">
-  <p:cSld>
-    <p:spTree>
-      <p:nvGrpSpPr>
-        <p:cNvPr id="1" name=""/>
-        <p:cNvGrpSpPr/>
-        <p:nvPr/>
-      </p:nvGrpSpPr>
-      <p:grpSpPr>
-        <a:xfrm>
-          <a:off x="0" y="0"/>
-          <a:ext cx="0" cy="0"/>
-          <a:chOff x="0" y="0"/>
-          <a:chExt cx="0" cy="0"/>
-        </a:xfrm>
-      </p:grpSpPr>
-      <p:pic>
-        <p:nvPicPr>
-          <p:cNvPr id="4" name="Picture 3"/>
-          <p:cNvPicPr>
-            <a:picLocks noChangeAspect="1"/>
-          </p:cNvPicPr>
-          <p:nvPr/>
-        </p:nvPicPr>
-        <p:blipFill>
-          <a:blip r:embed="rId2"/>
-          <a:stretch>
-            <a:fillRect/>
-          </a:stretch>
-        </p:blipFill>
-        <p:spPr>
-          <a:xfrm rot="2732641">
-            <a:off x="1670100" y="1242369"/>
-            <a:ext cx="1334399" cy="1334399"/>
-          </a:xfrm>
-          <a:prstGeom prst="rect">
-            <a:avLst/>
-          </a:prstGeom>
-        </p:spPr>
-      </p:pic>
-      <p:pic>
-        <p:nvPicPr>
-          <p:cNvPr id="1026" name="Picture 2" descr="https://d30y9cdsu7xlg0.cloudfront.net/png/9414-200.png"/>
-          <p:cNvPicPr>
-            <a:picLocks noChangeAspect="1" noChangeArrowheads="1"/>
-          </p:cNvPicPr>
-          <p:nvPr/>
-        </p:nvPicPr>
-        <p:blipFill>
-          <a:blip r:embed="rId3">
-            <a:extLst>
-              <a:ext uri="{28A0092B-C50C-407E-A947-70E740481C1C}">
-                <a14:useLocalDpi xmlns:a14="http://schemas.microsoft.com/office/drawing/2010/main" val="0"/>
-              </a:ext>
-            </a:extLst>
-          </a:blip>
-          <a:srcRect/>
-          <a:stretch>
-            <a:fillRect/>
-          </a:stretch>
-        </p:blipFill>
-        <p:spPr bwMode="auto">
-          <a:xfrm>
-            <a:off x="268267" y="296057"/>
-            <a:ext cx="1905000" cy="1905000"/>
-          </a:xfrm>
-          <a:prstGeom prst="rect">
-            <a:avLst/>
-          </a:prstGeom>
-          <a:noFill/>
-          <a:extLst>
-            <a:ext uri="{909E8E84-426E-40DD-AFC4-6F175D3DCCD1}">
-              <a14:hiddenFill xmlns:a14="http://schemas.microsoft.com/office/drawing/2010/main">
-                <a:solidFill>
-                  <a:srgbClr val="FFFFFF"/>
-                </a:solidFill>
-              </a14:hiddenFill>
-            </a:ext>
-          </a:extLst>
-        </p:spPr>
-      </p:pic>
-      <p:sp>
-        <p:nvSpPr>
-          <p:cNvPr id="5" name="TextBox 4"/>
-          <p:cNvSpPr txBox="1"/>
-          <p:nvPr/>
-        </p:nvSpPr>
-        <p:spPr>
-          <a:xfrm>
-            <a:off x="2879493" y="458216"/>
-            <a:ext cx="7937098" cy="1015663"/>
-          </a:xfrm>
-          <a:prstGeom prst="rect">
-            <a:avLst/>
-          </a:prstGeom>
-          <a:noFill/>
-        </p:spPr>
-        <p:txBody>
-          <a:bodyPr wrap="square" rtlCol="0">
-            <a:spAutoFit/>
-          </a:bodyPr>
-          <a:lstStyle/>
-          <a:p>
-            <a:r>
-              <a:rPr lang="en-US" sz="6000" b="1" dirty="0" smtClean="0">
-                <a:latin typeface="Cambria" panose="02040503050406030204" pitchFamily="18" charset="0"/>
-              </a:rPr>
-              <a:t>Our Solution:</a:t>
-            </a:r>
-          </a:p>
-        </p:txBody>
-      </p:sp>
-      <p:sp>
-        <p:nvSpPr>
-          <p:cNvPr id="6" name="TextBox 5"/>
-          <p:cNvSpPr txBox="1"/>
-          <p:nvPr/>
-        </p:nvSpPr>
-        <p:spPr>
-          <a:xfrm>
-            <a:off x="3298779" y="1617180"/>
-            <a:ext cx="7937098" cy="584775"/>
-          </a:xfrm>
-          <a:prstGeom prst="rect">
-            <a:avLst/>
-          </a:prstGeom>
-          <a:noFill/>
-        </p:spPr>
-        <p:txBody>
-          <a:bodyPr wrap="square" rtlCol="0">
-            <a:spAutoFit/>
-          </a:bodyPr>
-          <a:lstStyle/>
-          <a:p>
-            <a:r>
-              <a:rPr lang="en-US" sz="3200" b="1" dirty="0" smtClean="0">
-                <a:latin typeface="Cambria" panose="02040503050406030204" pitchFamily="18" charset="0"/>
-              </a:rPr>
-              <a:t>Take these meaningful diffs…</a:t>
-            </a:r>
-          </a:p>
-        </p:txBody>
-      </p:sp>
-      <p:pic>
-        <p:nvPicPr>
-          <p:cNvPr id="3" name="Picture 2"/>
-          <p:cNvPicPr>
-            <a:picLocks noChangeAspect="1"/>
-          </p:cNvPicPr>
-          <p:nvPr/>
-        </p:nvPicPr>
-        <p:blipFill>
-          <a:blip r:embed="rId4"/>
-          <a:stretch>
-            <a:fillRect/>
-          </a:stretch>
-        </p:blipFill>
-        <p:spPr>
-          <a:xfrm>
-            <a:off x="1220767" y="2561440"/>
-            <a:ext cx="4495800" cy="4267200"/>
-          </a:xfrm>
-          <a:prstGeom prst="rect">
-            <a:avLst/>
-          </a:prstGeom>
-        </p:spPr>
-      </p:pic>
-      <p:pic>
-        <p:nvPicPr>
-          <p:cNvPr id="7" name="Picture 6"/>
-          <p:cNvPicPr>
-            <a:picLocks noChangeAspect="1"/>
-          </p:cNvPicPr>
-          <p:nvPr/>
-        </p:nvPicPr>
-        <p:blipFill>
-          <a:blip r:embed="rId5"/>
-          <a:stretch>
-            <a:fillRect/>
-          </a:stretch>
-        </p:blipFill>
-        <p:spPr>
-          <a:xfrm>
-            <a:off x="7267328" y="2229243"/>
-            <a:ext cx="3751665" cy="4599397"/>
-          </a:xfrm>
-          <a:prstGeom prst="rect">
-            <a:avLst/>
-          </a:prstGeom>
-        </p:spPr>
-      </p:pic>
-    </p:spTree>
-    <p:extLst>
-      <p:ext uri="{BB962C8B-B14F-4D97-AF65-F5344CB8AC3E}">
-        <p14:creationId xmlns:p14="http://schemas.microsoft.com/office/powerpoint/2010/main" val="3617047302"/>
-      </p:ext>
-    </p:extLst>
-  </p:cSld>
-  <p:clrMapOvr>
-    <a:masterClrMapping/>
-  </p:clrMapOvr>
-  <p:timing>
-    <p:tnLst>
-      <p:par>
-        <p:cTn id="1" dur="indefinite" restart="never" nodeType="tmRoot"/>
-      </p:par>
-    </p:tnLst>
-  </p:timing>
-</p:sld>
-</file>
-
-<file path=ppt/slides/slide4.xml><?xml version="1.0" encoding="utf-8"?>
-<p:sld xmlns:a="http://schemas.openxmlformats.org/drawingml/2006/main" xmlns:r="http://schemas.openxmlformats.org/officeDocument/2006/relationships" xmlns:p="http://schemas.openxmlformats.org/presentationml/2006/main">
-  <p:cSld>
-    <p:spTree>
-      <p:nvGrpSpPr>
-        <p:cNvPr id="1" name=""/>
-        <p:cNvGrpSpPr/>
-        <p:nvPr/>
-      </p:nvGrpSpPr>
-      <p:grpSpPr>
-        <a:xfrm>
-          <a:off x="0" y="0"/>
-          <a:ext cx="0" cy="0"/>
-          <a:chOff x="0" y="0"/>
-          <a:chExt cx="0" cy="0"/>
-        </a:xfrm>
-      </p:grpSpPr>
-      <p:pic>
-        <p:nvPicPr>
-          <p:cNvPr id="4" name="Picture 3"/>
-          <p:cNvPicPr>
-            <a:picLocks noChangeAspect="1"/>
-          </p:cNvPicPr>
-          <p:nvPr/>
-        </p:nvPicPr>
-        <p:blipFill>
-          <a:blip r:embed="rId2"/>
-          <a:stretch>
-            <a:fillRect/>
-          </a:stretch>
-        </p:blipFill>
-        <p:spPr>
-          <a:xfrm rot="2732641">
-            <a:off x="1670100" y="1242369"/>
-            <a:ext cx="1334399" cy="1334399"/>
-          </a:xfrm>
-          <a:prstGeom prst="rect">
-            <a:avLst/>
-          </a:prstGeom>
-        </p:spPr>
-      </p:pic>
-      <p:pic>
-        <p:nvPicPr>
-          <p:cNvPr id="1026" name="Picture 2" descr="https://d30y9cdsu7xlg0.cloudfront.net/png/9414-200.png"/>
-          <p:cNvPicPr>
-            <a:picLocks noChangeAspect="1" noChangeArrowheads="1"/>
-          </p:cNvPicPr>
-          <p:nvPr/>
-        </p:nvPicPr>
-        <p:blipFill>
-          <a:blip r:embed="rId3">
-            <a:extLst>
-              <a:ext uri="{28A0092B-C50C-407E-A947-70E740481C1C}">
-                <a14:useLocalDpi xmlns:a14="http://schemas.microsoft.com/office/drawing/2010/main" val="0"/>
-              </a:ext>
-            </a:extLst>
-          </a:blip>
-          <a:srcRect/>
-          <a:stretch>
-            <a:fillRect/>
-          </a:stretch>
-        </p:blipFill>
-        <p:spPr bwMode="auto">
-          <a:xfrm>
-            <a:off x="268267" y="296057"/>
-            <a:ext cx="1905000" cy="1905000"/>
-          </a:xfrm>
-          <a:prstGeom prst="rect">
-            <a:avLst/>
-          </a:prstGeom>
-          <a:noFill/>
-          <a:extLst>
-            <a:ext uri="{909E8E84-426E-40DD-AFC4-6F175D3DCCD1}">
-              <a14:hiddenFill xmlns:a14="http://schemas.microsoft.com/office/drawing/2010/main">
-                <a:solidFill>
-                  <a:srgbClr val="FFFFFF"/>
-                </a:solidFill>
-              </a14:hiddenFill>
-            </a:ext>
-          </a:extLst>
-        </p:spPr>
-      </p:pic>
-      <p:sp>
-        <p:nvSpPr>
-          <p:cNvPr id="5" name="TextBox 4"/>
-          <p:cNvSpPr txBox="1"/>
-          <p:nvPr/>
-        </p:nvSpPr>
-        <p:spPr>
-          <a:xfrm>
-            <a:off x="2879493" y="458216"/>
-            <a:ext cx="7937098" cy="1015663"/>
-          </a:xfrm>
-          <a:prstGeom prst="rect">
-            <a:avLst/>
-          </a:prstGeom>
-          <a:noFill/>
-        </p:spPr>
-        <p:txBody>
-          <a:bodyPr wrap="square" rtlCol="0">
-            <a:spAutoFit/>
-          </a:bodyPr>
-          <a:lstStyle/>
-          <a:p>
-            <a:r>
-              <a:rPr lang="en-US" sz="6000" b="1" dirty="0" smtClean="0">
-                <a:latin typeface="Cambria" panose="02040503050406030204" pitchFamily="18" charset="0"/>
-              </a:rPr>
-              <a:t>Our Solution:</a:t>
-            </a:r>
-          </a:p>
-        </p:txBody>
-      </p:sp>
-      <p:sp>
-        <p:nvSpPr>
-          <p:cNvPr id="6" name="TextBox 5"/>
-          <p:cNvSpPr txBox="1"/>
-          <p:nvPr/>
-        </p:nvSpPr>
-        <p:spPr>
-          <a:xfrm>
-            <a:off x="3298779" y="1617180"/>
-            <a:ext cx="7937098" cy="584775"/>
-          </a:xfrm>
-          <a:prstGeom prst="rect">
-            <a:avLst/>
-          </a:prstGeom>
-          <a:noFill/>
-        </p:spPr>
-        <p:txBody>
-          <a:bodyPr wrap="square" rtlCol="0">
-            <a:spAutoFit/>
-          </a:bodyPr>
-          <a:lstStyle/>
-          <a:p>
-            <a:r>
-              <a:rPr lang="en-US" sz="3200" b="1" dirty="0" smtClean="0">
-                <a:latin typeface="Cambria" panose="02040503050406030204" pitchFamily="18" charset="0"/>
-              </a:rPr>
-              <a:t>Take these meaningful diffs…</a:t>
-            </a:r>
-          </a:p>
-        </p:txBody>
-      </p:sp>
-      <p:pic>
-        <p:nvPicPr>
-          <p:cNvPr id="2" name="Picture 1"/>
-          <p:cNvPicPr>
-            <a:picLocks noChangeAspect="1"/>
-          </p:cNvPicPr>
-          <p:nvPr/>
-        </p:nvPicPr>
-        <p:blipFill>
-          <a:blip r:embed="rId4" cstate="print">
-            <a:extLst>
-              <a:ext uri="{28A0092B-C50C-407E-A947-70E740481C1C}">
-                <a14:useLocalDpi xmlns:a14="http://schemas.microsoft.com/office/drawing/2010/main" val="0"/>
-              </a:ext>
-            </a:extLst>
-          </a:blip>
-          <a:stretch>
-            <a:fillRect/>
-          </a:stretch>
-        </p:blipFill>
-        <p:spPr>
-          <a:xfrm>
-            <a:off x="0" y="2708889"/>
-            <a:ext cx="12192000" cy="4149111"/>
-          </a:xfrm>
-          <a:prstGeom prst="rect">
-            <a:avLst/>
-          </a:prstGeom>
-        </p:spPr>
-      </p:pic>
-    </p:spTree>
-    <p:extLst>
-      <p:ext uri="{BB962C8B-B14F-4D97-AF65-F5344CB8AC3E}">
-        <p14:creationId xmlns:p14="http://schemas.microsoft.com/office/powerpoint/2010/main" val="1983676832"/>
-      </p:ext>
-    </p:extLst>
-  </p:cSld>
-  <p:clrMapOvr>
-    <a:masterClrMapping/>
-  </p:clrMapOvr>
-  <p:timing>
-    <p:tnLst>
-      <p:par>
-        <p:cTn id="1" dur="indefinite" restart="never" nodeType="tmRoot"/>
-      </p:par>
-    </p:tnLst>
-  </p:timing>
-</p:sld>
-</file>
-
-<file path=ppt/slides/slide5.xml><?xml version="1.0" encoding="utf-8"?>
-<p:sld xmlns:a="http://schemas.openxmlformats.org/drawingml/2006/main" xmlns:r="http://schemas.openxmlformats.org/officeDocument/2006/relationships" xmlns:p="http://schemas.openxmlformats.org/presentationml/2006/main">
-  <p:cSld>
-    <p:spTree>
-      <p:nvGrpSpPr>
-        <p:cNvPr id="1" name=""/>
-        <p:cNvGrpSpPr/>
-        <p:nvPr/>
-      </p:nvGrpSpPr>
-      <p:grpSpPr>
-        <a:xfrm>
-          <a:off x="0" y="0"/>
-          <a:ext cx="0" cy="0"/>
-          <a:chOff x="0" y="0"/>
-          <a:chExt cx="0" cy="0"/>
-        </a:xfrm>
-      </p:grpSpPr>
-      <p:pic>
-        <p:nvPicPr>
-          <p:cNvPr id="4" name="Picture 3"/>
-          <p:cNvPicPr>
-            <a:picLocks noChangeAspect="1"/>
-          </p:cNvPicPr>
-          <p:nvPr/>
-        </p:nvPicPr>
-        <p:blipFill>
-          <a:blip r:embed="rId2"/>
-          <a:stretch>
-            <a:fillRect/>
-          </a:stretch>
-        </p:blipFill>
-        <p:spPr>
-          <a:xfrm rot="2732641">
-            <a:off x="1670100" y="1242369"/>
-            <a:ext cx="1334399" cy="1334399"/>
-          </a:xfrm>
-          <a:prstGeom prst="rect">
-            <a:avLst/>
-          </a:prstGeom>
-        </p:spPr>
-      </p:pic>
-      <p:pic>
-        <p:nvPicPr>
-          <p:cNvPr id="1026" name="Picture 2" descr="https://d30y9cdsu7xlg0.cloudfront.net/png/9414-200.png"/>
-          <p:cNvPicPr>
-            <a:picLocks noChangeAspect="1" noChangeArrowheads="1"/>
-          </p:cNvPicPr>
-          <p:nvPr/>
-        </p:nvPicPr>
-        <p:blipFill>
-          <a:blip r:embed="rId3">
-            <a:extLst>
-              <a:ext uri="{28A0092B-C50C-407E-A947-70E740481C1C}">
-                <a14:useLocalDpi xmlns:a14="http://schemas.microsoft.com/office/drawing/2010/main" val="0"/>
-              </a:ext>
-            </a:extLst>
-          </a:blip>
-          <a:srcRect/>
-          <a:stretch>
-            <a:fillRect/>
-          </a:stretch>
-        </p:blipFill>
-        <p:spPr bwMode="auto">
-          <a:xfrm>
-            <a:off x="268267" y="296057"/>
-            <a:ext cx="1905000" cy="1905000"/>
-          </a:xfrm>
-          <a:prstGeom prst="rect">
-            <a:avLst/>
-          </a:prstGeom>
-          <a:noFill/>
-          <a:extLst>
-            <a:ext uri="{909E8E84-426E-40DD-AFC4-6F175D3DCCD1}">
-              <a14:hiddenFill xmlns:a14="http://schemas.microsoft.com/office/drawing/2010/main">
-                <a:solidFill>
-                  <a:srgbClr val="FFFFFF"/>
-                </a:solidFill>
-              </a14:hiddenFill>
-            </a:ext>
-          </a:extLst>
-        </p:spPr>
-      </p:pic>
-      <p:sp>
-        <p:nvSpPr>
-          <p:cNvPr id="5" name="TextBox 4"/>
-          <p:cNvSpPr txBox="1"/>
-          <p:nvPr/>
-        </p:nvSpPr>
-        <p:spPr>
-          <a:xfrm>
-            <a:off x="2879493" y="458216"/>
-            <a:ext cx="7937098" cy="1015663"/>
-          </a:xfrm>
-          <a:prstGeom prst="rect">
-            <a:avLst/>
-          </a:prstGeom>
-          <a:noFill/>
-        </p:spPr>
-        <p:txBody>
-          <a:bodyPr wrap="square" rtlCol="0">
-            <a:spAutoFit/>
-          </a:bodyPr>
-          <a:lstStyle/>
-          <a:p>
-            <a:r>
-              <a:rPr lang="en-US" sz="6000" b="1" dirty="0" smtClean="0">
-                <a:latin typeface="Cambria" panose="02040503050406030204" pitchFamily="18" charset="0"/>
-              </a:rPr>
               <a:t>Our Solution:</a:t>
             </a:r>
           </a:p>
@@ -4132,9 +3093,6 @@
               </a:rPr>
               <a:t>Main files</a:t>
             </a:r>
-            <a:endParaRPr lang="en-US" sz="3200" b="1" dirty="0" smtClean="0">
-              <a:latin typeface="Cambria" panose="02040503050406030204" pitchFamily="18" charset="0"/>
-            </a:endParaRPr>
           </a:p>
         </p:txBody>
       </p:sp>
@@ -4170,19 +3128,7 @@
               <a:rPr lang="en-US" sz="2000" dirty="0" smtClean="0">
                 <a:latin typeface="Cambria" panose="02040503050406030204" pitchFamily="18" charset="0"/>
               </a:rPr>
-              <a:t>Shell script; </a:t>
-            </a:r>
-            <a:r>
-              <a:rPr lang="en-US" sz="2000" dirty="0" smtClean="0">
-                <a:latin typeface="Cambria" panose="02040503050406030204" pitchFamily="18" charset="0"/>
-              </a:rPr>
-              <a:t>I</a:t>
-            </a:r>
-            <a:r>
-              <a:rPr lang="en-US" sz="2000" dirty="0" smtClean="0">
-                <a:latin typeface="Cambria" panose="02040503050406030204" pitchFamily="18" charset="0"/>
-              </a:rPr>
-              <a:t>nstalls Captain Hook and modifies settings</a:t>
+              <a:t>Shell script; Installs Captain Hook and modifies settings</a:t>
             </a:r>
           </a:p>
           <a:p>
@@ -4382,1216 +3328,6 @@
     <p:extLst>
       <p:ext uri="{BB962C8B-B14F-4D97-AF65-F5344CB8AC3E}">
         <p14:creationId xmlns:p14="http://schemas.microsoft.com/office/powerpoint/2010/main" val="1381622758"/>
-      </p:ext>
-    </p:extLst>
-  </p:cSld>
-  <p:clrMapOvr>
-    <a:masterClrMapping/>
-  </p:clrMapOvr>
-  <p:timing>
-    <p:tnLst>
-      <p:par>
-        <p:cTn id="1" dur="indefinite" restart="never" nodeType="tmRoot"/>
-      </p:par>
-    </p:tnLst>
-  </p:timing>
-</p:sld>
-</file>
-
-<file path=ppt/slides/slide6.xml><?xml version="1.0" encoding="utf-8"?>
-<p:sld xmlns:a="http://schemas.openxmlformats.org/drawingml/2006/main" xmlns:r="http://schemas.openxmlformats.org/officeDocument/2006/relationships" xmlns:p="http://schemas.openxmlformats.org/presentationml/2006/main">
-  <p:cSld>
-    <p:spTree>
-      <p:nvGrpSpPr>
-        <p:cNvPr id="1" name=""/>
-        <p:cNvGrpSpPr/>
-        <p:nvPr/>
-      </p:nvGrpSpPr>
-      <p:grpSpPr>
-        <a:xfrm>
-          <a:off x="0" y="0"/>
-          <a:ext cx="0" cy="0"/>
-          <a:chOff x="0" y="0"/>
-          <a:chExt cx="0" cy="0"/>
-        </a:xfrm>
-      </p:grpSpPr>
-      <p:pic>
-        <p:nvPicPr>
-          <p:cNvPr id="4" name="Picture 3"/>
-          <p:cNvPicPr>
-            <a:picLocks noChangeAspect="1"/>
-          </p:cNvPicPr>
-          <p:nvPr/>
-        </p:nvPicPr>
-        <p:blipFill>
-          <a:blip r:embed="rId2"/>
-          <a:stretch>
-            <a:fillRect/>
-          </a:stretch>
-        </p:blipFill>
-        <p:spPr>
-          <a:xfrm rot="2732641">
-            <a:off x="1670100" y="1242369"/>
-            <a:ext cx="1334399" cy="1334399"/>
-          </a:xfrm>
-          <a:prstGeom prst="rect">
-            <a:avLst/>
-          </a:prstGeom>
-        </p:spPr>
-      </p:pic>
-      <p:pic>
-        <p:nvPicPr>
-          <p:cNvPr id="1026" name="Picture 2" descr="https://d30y9cdsu7xlg0.cloudfront.net/png/9414-200.png"/>
-          <p:cNvPicPr>
-            <a:picLocks noChangeAspect="1" noChangeArrowheads="1"/>
-          </p:cNvPicPr>
-          <p:nvPr/>
-        </p:nvPicPr>
-        <p:blipFill>
-          <a:blip r:embed="rId3">
-            <a:extLst>
-              <a:ext uri="{28A0092B-C50C-407E-A947-70E740481C1C}">
-                <a14:useLocalDpi xmlns:a14="http://schemas.microsoft.com/office/drawing/2010/main" val="0"/>
-              </a:ext>
-            </a:extLst>
-          </a:blip>
-          <a:srcRect/>
-          <a:stretch>
-            <a:fillRect/>
-          </a:stretch>
-        </p:blipFill>
-        <p:spPr bwMode="auto">
-          <a:xfrm>
-            <a:off x="268267" y="296057"/>
-            <a:ext cx="1905000" cy="1905000"/>
-          </a:xfrm>
-          <a:prstGeom prst="rect">
-            <a:avLst/>
-          </a:prstGeom>
-          <a:noFill/>
-          <a:extLst>
-            <a:ext uri="{909E8E84-426E-40DD-AFC4-6F175D3DCCD1}">
-              <a14:hiddenFill xmlns:a14="http://schemas.microsoft.com/office/drawing/2010/main">
-                <a:solidFill>
-                  <a:srgbClr val="FFFFFF"/>
-                </a:solidFill>
-              </a14:hiddenFill>
-            </a:ext>
-          </a:extLst>
-        </p:spPr>
-      </p:pic>
-      <p:sp>
-        <p:nvSpPr>
-          <p:cNvPr id="5" name="TextBox 4"/>
-          <p:cNvSpPr txBox="1"/>
-          <p:nvPr/>
-        </p:nvSpPr>
-        <p:spPr>
-          <a:xfrm>
-            <a:off x="2879493" y="458216"/>
-            <a:ext cx="7937098" cy="1015663"/>
-          </a:xfrm>
-          <a:prstGeom prst="rect">
-            <a:avLst/>
-          </a:prstGeom>
-          <a:noFill/>
-        </p:spPr>
-        <p:txBody>
-          <a:bodyPr wrap="square" rtlCol="0">
-            <a:spAutoFit/>
-          </a:bodyPr>
-          <a:lstStyle/>
-          <a:p>
-            <a:r>
-              <a:rPr lang="en-US" sz="6000" b="1" dirty="0" smtClean="0">
-                <a:latin typeface="Cambria" panose="02040503050406030204" pitchFamily="18" charset="0"/>
-              </a:rPr>
-              <a:t>Tech Stack:</a:t>
-            </a:r>
-          </a:p>
-        </p:txBody>
-      </p:sp>
-      <p:pic>
-        <p:nvPicPr>
-          <p:cNvPr id="6" name="Picture 5"/>
-          <p:cNvPicPr>
-            <a:picLocks noChangeAspect="1"/>
-          </p:cNvPicPr>
-          <p:nvPr/>
-        </p:nvPicPr>
-        <p:blipFill>
-          <a:blip r:embed="rId2"/>
-          <a:stretch>
-            <a:fillRect/>
-          </a:stretch>
-        </p:blipFill>
-        <p:spPr>
-          <a:xfrm rot="2732641">
-            <a:off x="3014545" y="1848475"/>
-            <a:ext cx="626332" cy="626332"/>
-          </a:xfrm>
-          <a:prstGeom prst="rect">
-            <a:avLst/>
-          </a:prstGeom>
-        </p:spPr>
-      </p:pic>
-      <p:sp>
-        <p:nvSpPr>
-          <p:cNvPr id="7" name="TextBox 6"/>
-          <p:cNvSpPr txBox="1"/>
-          <p:nvPr/>
-        </p:nvSpPr>
-        <p:spPr>
-          <a:xfrm>
-            <a:off x="3765221" y="1883593"/>
-            <a:ext cx="7937098" cy="4093428"/>
-          </a:xfrm>
-          <a:prstGeom prst="rect">
-            <a:avLst/>
-          </a:prstGeom>
-          <a:noFill/>
-        </p:spPr>
-        <p:txBody>
-          <a:bodyPr wrap="square" rtlCol="0">
-            <a:spAutoFit/>
-          </a:bodyPr>
-          <a:lstStyle/>
-          <a:p>
-            <a:r>
-              <a:rPr lang="en-US" sz="2000" b="1" dirty="0" err="1" smtClean="0">
-                <a:latin typeface="Cambria" panose="02040503050406030204" pitchFamily="18" charset="0"/>
-              </a:rPr>
-              <a:t>OpenStudio</a:t>
-            </a:r>
-            <a:r>
-              <a:rPr lang="en-US" sz="2000" b="1" dirty="0" smtClean="0">
-                <a:latin typeface="Cambria" panose="02040503050406030204" pitchFamily="18" charset="0"/>
-              </a:rPr>
-              <a:t> + </a:t>
-            </a:r>
-            <a:r>
-              <a:rPr lang="en-US" sz="2000" b="1" dirty="0" err="1" smtClean="0">
-                <a:latin typeface="Cambria" panose="02040503050406030204" pitchFamily="18" charset="0"/>
-              </a:rPr>
-              <a:t>ReportModelChanges</a:t>
-            </a:r>
-            <a:r>
-              <a:rPr lang="en-US" sz="2000" b="1" dirty="0" smtClean="0">
-                <a:latin typeface="Cambria" panose="02040503050406030204" pitchFamily="18" charset="0"/>
-              </a:rPr>
-              <a:t> Measure</a:t>
-            </a:r>
-          </a:p>
-          <a:p>
-            <a:endParaRPr lang="en-US" sz="2000" b="1" dirty="0">
-              <a:latin typeface="Cambria" panose="02040503050406030204" pitchFamily="18" charset="0"/>
-            </a:endParaRPr>
-          </a:p>
-          <a:p>
-            <a:r>
-              <a:rPr lang="en-US" sz="2000" b="1" dirty="0" smtClean="0">
-                <a:latin typeface="Cambria" panose="02040503050406030204" pitchFamily="18" charset="0"/>
-              </a:rPr>
-              <a:t>Grasshopper </a:t>
-            </a:r>
-          </a:p>
-          <a:p>
-            <a:endParaRPr lang="en-US" sz="2000" b="1" dirty="0">
-              <a:latin typeface="Cambria" panose="02040503050406030204" pitchFamily="18" charset="0"/>
-            </a:endParaRPr>
-          </a:p>
-          <a:p>
-            <a:r>
-              <a:rPr lang="en-US" sz="2000" b="1" dirty="0" smtClean="0">
-                <a:latin typeface="Cambria" panose="02040503050406030204" pitchFamily="18" charset="0"/>
-              </a:rPr>
-              <a:t>VVD </a:t>
-            </a:r>
-            <a:r>
-              <a:rPr lang="en-US" sz="2000" b="1" i="1" dirty="0" smtClean="0">
-                <a:latin typeface="Cambria" panose="02040503050406030204" pitchFamily="18" charset="0"/>
-              </a:rPr>
-              <a:t>(diff engine for grasshopper files from Thornton </a:t>
-            </a:r>
-            <a:r>
-              <a:rPr lang="en-US" sz="2000" b="1" i="1" dirty="0" err="1" smtClean="0">
-                <a:latin typeface="Cambria" panose="02040503050406030204" pitchFamily="18" charset="0"/>
-              </a:rPr>
-              <a:t>Tomasetti</a:t>
-            </a:r>
-            <a:r>
-              <a:rPr lang="en-US" sz="2000" b="1" i="1" dirty="0" smtClean="0">
-                <a:latin typeface="Cambria" panose="02040503050406030204" pitchFamily="18" charset="0"/>
-              </a:rPr>
-              <a:t> AEC Hackathon 2015)</a:t>
-            </a:r>
-          </a:p>
-          <a:p>
-            <a:endParaRPr lang="en-US" sz="2000" b="1" dirty="0">
-              <a:latin typeface="Cambria" panose="02040503050406030204" pitchFamily="18" charset="0"/>
-            </a:endParaRPr>
-          </a:p>
-          <a:p>
-            <a:r>
-              <a:rPr lang="en-US" sz="2000" b="1" dirty="0" smtClean="0">
-                <a:latin typeface="Cambria" panose="02040503050406030204" pitchFamily="18" charset="0"/>
-              </a:rPr>
-              <a:t>Node.js + Docker</a:t>
-            </a:r>
-          </a:p>
-          <a:p>
-            <a:endParaRPr lang="en-US" sz="2000" b="1" dirty="0">
-              <a:latin typeface="Cambria" panose="02040503050406030204" pitchFamily="18" charset="0"/>
-            </a:endParaRPr>
-          </a:p>
-          <a:p>
-            <a:r>
-              <a:rPr lang="en-US" sz="2000" b="1" dirty="0" smtClean="0">
-                <a:latin typeface="Cambria" panose="02040503050406030204" pitchFamily="18" charset="0"/>
-              </a:rPr>
-              <a:t>All code free/</a:t>
-            </a:r>
-            <a:r>
-              <a:rPr lang="en-US" sz="2000" b="1" dirty="0" err="1" smtClean="0">
-                <a:latin typeface="Cambria" panose="02040503050406030204" pitchFamily="18" charset="0"/>
-              </a:rPr>
-              <a:t>opensource</a:t>
-            </a:r>
-            <a:r>
-              <a:rPr lang="en-US" sz="2000" b="1" dirty="0" smtClean="0">
-                <a:latin typeface="Cambria" panose="02040503050406030204" pitchFamily="18" charset="0"/>
-              </a:rPr>
-              <a:t> (MIT License)</a:t>
-            </a:r>
-          </a:p>
-          <a:p>
-            <a:endParaRPr lang="en-US" sz="2000" b="1" dirty="0" smtClean="0">
-              <a:latin typeface="Cambria" panose="02040503050406030204" pitchFamily="18" charset="0"/>
-            </a:endParaRPr>
-          </a:p>
-          <a:p>
-            <a:r>
-              <a:rPr lang="en-US" sz="2000" b="1" dirty="0" smtClean="0">
-                <a:latin typeface="Cambria" panose="02040503050406030204" pitchFamily="18" charset="0"/>
-                <a:hlinkClick r:id="rId4"/>
-              </a:rPr>
-              <a:t>github.com/</a:t>
-            </a:r>
-            <a:r>
-              <a:rPr lang="en-US" sz="2000" b="1" dirty="0" err="1" smtClean="0">
-                <a:latin typeface="Cambria" panose="02040503050406030204" pitchFamily="18" charset="0"/>
-                <a:hlinkClick r:id="rId4"/>
-              </a:rPr>
-              <a:t>andrewsalveson</a:t>
-            </a:r>
-            <a:r>
-              <a:rPr lang="en-US" sz="2000" b="1" dirty="0" smtClean="0">
-                <a:latin typeface="Cambria" panose="02040503050406030204" pitchFamily="18" charset="0"/>
-                <a:hlinkClick r:id="rId4"/>
-              </a:rPr>
-              <a:t>/</a:t>
-            </a:r>
-            <a:r>
-              <a:rPr lang="en-US" sz="2000" b="1" dirty="0" err="1" smtClean="0">
-                <a:latin typeface="Cambria" panose="02040503050406030204" pitchFamily="18" charset="0"/>
-                <a:hlinkClick r:id="rId4"/>
-              </a:rPr>
-              <a:t>CaptainHook</a:t>
-            </a:r>
-            <a:r>
-              <a:rPr lang="en-US" sz="2000" b="1" dirty="0" smtClean="0">
-                <a:latin typeface="Cambria" panose="02040503050406030204" pitchFamily="18" charset="0"/>
-                <a:hlinkClick r:id="rId4"/>
-              </a:rPr>
-              <a:t>/</a:t>
-            </a:r>
-            <a:endParaRPr lang="en-US" sz="2000" b="1" dirty="0" smtClean="0">
-              <a:latin typeface="Cambria" panose="02040503050406030204" pitchFamily="18" charset="0"/>
-            </a:endParaRPr>
-          </a:p>
-          <a:p>
-            <a:r>
-              <a:rPr lang="en-US" sz="2000" b="1" dirty="0" smtClean="0">
-                <a:latin typeface="Cambria" panose="02040503050406030204" pitchFamily="18" charset="0"/>
-                <a:hlinkClick r:id="rId5"/>
-              </a:rPr>
-              <a:t>github.com/</a:t>
-            </a:r>
-            <a:r>
-              <a:rPr lang="en-US" sz="2000" b="1" dirty="0" err="1" smtClean="0">
-                <a:latin typeface="Cambria" panose="02040503050406030204" pitchFamily="18" charset="0"/>
-                <a:hlinkClick r:id="rId5"/>
-              </a:rPr>
-              <a:t>andrewsalveson</a:t>
-            </a:r>
-            <a:r>
-              <a:rPr lang="en-US" sz="2000" b="1" dirty="0" smtClean="0">
-                <a:latin typeface="Cambria" panose="02040503050406030204" pitchFamily="18" charset="0"/>
-                <a:hlinkClick r:id="rId5"/>
-              </a:rPr>
-              <a:t>/</a:t>
-            </a:r>
-            <a:r>
-              <a:rPr lang="en-US" sz="2000" b="1" dirty="0" err="1" smtClean="0">
-                <a:latin typeface="Cambria" panose="02040503050406030204" pitchFamily="18" charset="0"/>
-                <a:hlinkClick r:id="rId5"/>
-              </a:rPr>
-              <a:t>CaptainHook</a:t>
-            </a:r>
-            <a:r>
-              <a:rPr lang="en-US" sz="2000" b="1" dirty="0" smtClean="0">
-                <a:latin typeface="Cambria" panose="02040503050406030204" pitchFamily="18" charset="0"/>
-                <a:hlinkClick r:id="rId5"/>
-              </a:rPr>
-              <a:t>-service/</a:t>
-            </a:r>
-            <a:endParaRPr lang="en-US" sz="2000" b="1" dirty="0" smtClean="0">
-              <a:latin typeface="Cambria" panose="02040503050406030204" pitchFamily="18" charset="0"/>
-            </a:endParaRPr>
-          </a:p>
-        </p:txBody>
-      </p:sp>
-      <p:pic>
-        <p:nvPicPr>
-          <p:cNvPr id="8" name="Picture 7"/>
-          <p:cNvPicPr>
-            <a:picLocks noChangeAspect="1"/>
-          </p:cNvPicPr>
-          <p:nvPr/>
-        </p:nvPicPr>
-        <p:blipFill>
-          <a:blip r:embed="rId2"/>
-          <a:stretch>
-            <a:fillRect/>
-          </a:stretch>
-        </p:blipFill>
-        <p:spPr>
-          <a:xfrm rot="2732641">
-            <a:off x="3009191" y="2505038"/>
-            <a:ext cx="626332" cy="626332"/>
-          </a:xfrm>
-          <a:prstGeom prst="rect">
-            <a:avLst/>
-          </a:prstGeom>
-        </p:spPr>
-      </p:pic>
-      <p:pic>
-        <p:nvPicPr>
-          <p:cNvPr id="9" name="Picture 8"/>
-          <p:cNvPicPr>
-            <a:picLocks noChangeAspect="1"/>
-          </p:cNvPicPr>
-          <p:nvPr/>
-        </p:nvPicPr>
-        <p:blipFill>
-          <a:blip r:embed="rId2"/>
-          <a:stretch>
-            <a:fillRect/>
-          </a:stretch>
-        </p:blipFill>
-        <p:spPr>
-          <a:xfrm rot="2732641">
-            <a:off x="3011868" y="3161598"/>
-            <a:ext cx="626332" cy="626332"/>
-          </a:xfrm>
-          <a:prstGeom prst="rect">
-            <a:avLst/>
-          </a:prstGeom>
-        </p:spPr>
-      </p:pic>
-      <p:pic>
-        <p:nvPicPr>
-          <p:cNvPr id="10" name="Picture 9"/>
-          <p:cNvPicPr>
-            <a:picLocks noChangeAspect="1"/>
-          </p:cNvPicPr>
-          <p:nvPr/>
-        </p:nvPicPr>
-        <p:blipFill>
-          <a:blip r:embed="rId2"/>
-          <a:stretch>
-            <a:fillRect/>
-          </a:stretch>
-        </p:blipFill>
-        <p:spPr>
-          <a:xfrm rot="2732641">
-            <a:off x="2967653" y="3886637"/>
-            <a:ext cx="626332" cy="626332"/>
-          </a:xfrm>
-          <a:prstGeom prst="rect">
-            <a:avLst/>
-          </a:prstGeom>
-        </p:spPr>
-      </p:pic>
-      <p:pic>
-        <p:nvPicPr>
-          <p:cNvPr id="11" name="Picture 10"/>
-          <p:cNvPicPr>
-            <a:picLocks noChangeAspect="1"/>
-          </p:cNvPicPr>
-          <p:nvPr/>
-        </p:nvPicPr>
-        <p:blipFill>
-          <a:blip r:embed="rId2"/>
-          <a:stretch>
-            <a:fillRect/>
-          </a:stretch>
-        </p:blipFill>
-        <p:spPr>
-          <a:xfrm rot="2732641">
-            <a:off x="2962299" y="4543200"/>
-            <a:ext cx="626332" cy="626332"/>
-          </a:xfrm>
-          <a:prstGeom prst="rect">
-            <a:avLst/>
-          </a:prstGeom>
-        </p:spPr>
-      </p:pic>
-      <p:pic>
-        <p:nvPicPr>
-          <p:cNvPr id="12" name="Picture 11"/>
-          <p:cNvPicPr>
-            <a:picLocks noChangeAspect="1"/>
-          </p:cNvPicPr>
-          <p:nvPr/>
-        </p:nvPicPr>
-        <p:blipFill>
-          <a:blip r:embed="rId2"/>
-          <a:stretch>
-            <a:fillRect/>
-          </a:stretch>
-        </p:blipFill>
-        <p:spPr>
-          <a:xfrm rot="2732641">
-            <a:off x="2964976" y="5199760"/>
-            <a:ext cx="626332" cy="626332"/>
-          </a:xfrm>
-          <a:prstGeom prst="rect">
-            <a:avLst/>
-          </a:prstGeom>
-        </p:spPr>
-      </p:pic>
-    </p:spTree>
-    <p:extLst>
-      <p:ext uri="{BB962C8B-B14F-4D97-AF65-F5344CB8AC3E}">
-        <p14:creationId xmlns:p14="http://schemas.microsoft.com/office/powerpoint/2010/main" val="4063731867"/>
-      </p:ext>
-    </p:extLst>
-  </p:cSld>
-  <p:clrMapOvr>
-    <a:masterClrMapping/>
-  </p:clrMapOvr>
-  <p:timing>
-    <p:tnLst>
-      <p:par>
-        <p:cTn id="1" dur="indefinite" restart="never" nodeType="tmRoot"/>
-      </p:par>
-    </p:tnLst>
-  </p:timing>
-</p:sld>
-</file>
-
-<file path=ppt/slides/slide7.xml><?xml version="1.0" encoding="utf-8"?>
-<p:sld xmlns:a="http://schemas.openxmlformats.org/drawingml/2006/main" xmlns:r="http://schemas.openxmlformats.org/officeDocument/2006/relationships" xmlns:p="http://schemas.openxmlformats.org/presentationml/2006/main">
-  <p:cSld>
-    <p:spTree>
-      <p:nvGrpSpPr>
-        <p:cNvPr id="1" name=""/>
-        <p:cNvGrpSpPr/>
-        <p:nvPr/>
-      </p:nvGrpSpPr>
-      <p:grpSpPr>
-        <a:xfrm>
-          <a:off x="0" y="0"/>
-          <a:ext cx="0" cy="0"/>
-          <a:chOff x="0" y="0"/>
-          <a:chExt cx="0" cy="0"/>
-        </a:xfrm>
-      </p:grpSpPr>
-      <p:pic>
-        <p:nvPicPr>
-          <p:cNvPr id="4" name="Picture 3"/>
-          <p:cNvPicPr>
-            <a:picLocks noChangeAspect="1"/>
-          </p:cNvPicPr>
-          <p:nvPr/>
-        </p:nvPicPr>
-        <p:blipFill>
-          <a:blip r:embed="rId2"/>
-          <a:stretch>
-            <a:fillRect/>
-          </a:stretch>
-        </p:blipFill>
-        <p:spPr>
-          <a:xfrm rot="2732641">
-            <a:off x="1670100" y="1242369"/>
-            <a:ext cx="1334399" cy="1334399"/>
-          </a:xfrm>
-          <a:prstGeom prst="rect">
-            <a:avLst/>
-          </a:prstGeom>
-        </p:spPr>
-      </p:pic>
-      <p:pic>
-        <p:nvPicPr>
-          <p:cNvPr id="1026" name="Picture 2" descr="https://d30y9cdsu7xlg0.cloudfront.net/png/9414-200.png"/>
-          <p:cNvPicPr>
-            <a:picLocks noChangeAspect="1" noChangeArrowheads="1"/>
-          </p:cNvPicPr>
-          <p:nvPr/>
-        </p:nvPicPr>
-        <p:blipFill>
-          <a:blip r:embed="rId3">
-            <a:extLst>
-              <a:ext uri="{28A0092B-C50C-407E-A947-70E740481C1C}">
-                <a14:useLocalDpi xmlns:a14="http://schemas.microsoft.com/office/drawing/2010/main" val="0"/>
-              </a:ext>
-            </a:extLst>
-          </a:blip>
-          <a:srcRect/>
-          <a:stretch>
-            <a:fillRect/>
-          </a:stretch>
-        </p:blipFill>
-        <p:spPr bwMode="auto">
-          <a:xfrm>
-            <a:off x="268267" y="296057"/>
-            <a:ext cx="1905000" cy="1905000"/>
-          </a:xfrm>
-          <a:prstGeom prst="rect">
-            <a:avLst/>
-          </a:prstGeom>
-          <a:noFill/>
-          <a:extLst>
-            <a:ext uri="{909E8E84-426E-40DD-AFC4-6F175D3DCCD1}">
-              <a14:hiddenFill xmlns:a14="http://schemas.microsoft.com/office/drawing/2010/main">
-                <a:solidFill>
-                  <a:srgbClr val="FFFFFF"/>
-                </a:solidFill>
-              </a14:hiddenFill>
-            </a:ext>
-          </a:extLst>
-        </p:spPr>
-      </p:pic>
-      <p:sp>
-        <p:nvSpPr>
-          <p:cNvPr id="5" name="TextBox 4"/>
-          <p:cNvSpPr txBox="1"/>
-          <p:nvPr/>
-        </p:nvSpPr>
-        <p:spPr>
-          <a:xfrm>
-            <a:off x="2879493" y="458216"/>
-            <a:ext cx="7937098" cy="1015663"/>
-          </a:xfrm>
-          <a:prstGeom prst="rect">
-            <a:avLst/>
-          </a:prstGeom>
-          <a:noFill/>
-        </p:spPr>
-        <p:txBody>
-          <a:bodyPr wrap="square" rtlCol="0">
-            <a:spAutoFit/>
-          </a:bodyPr>
-          <a:lstStyle/>
-          <a:p>
-            <a:r>
-              <a:rPr lang="en-US" sz="6000" b="1" dirty="0" smtClean="0">
-                <a:latin typeface="Cambria" panose="02040503050406030204" pitchFamily="18" charset="0"/>
-              </a:rPr>
-              <a:t>What We Learned:</a:t>
-            </a:r>
-          </a:p>
-        </p:txBody>
-      </p:sp>
-      <p:pic>
-        <p:nvPicPr>
-          <p:cNvPr id="6" name="Picture 5"/>
-          <p:cNvPicPr>
-            <a:picLocks noChangeAspect="1"/>
-          </p:cNvPicPr>
-          <p:nvPr/>
-        </p:nvPicPr>
-        <p:blipFill>
-          <a:blip r:embed="rId2"/>
-          <a:stretch>
-            <a:fillRect/>
-          </a:stretch>
-        </p:blipFill>
-        <p:spPr>
-          <a:xfrm rot="2732641">
-            <a:off x="3014545" y="1848475"/>
-            <a:ext cx="626332" cy="626332"/>
-          </a:xfrm>
-          <a:prstGeom prst="rect">
-            <a:avLst/>
-          </a:prstGeom>
-        </p:spPr>
-      </p:pic>
-      <p:sp>
-        <p:nvSpPr>
-          <p:cNvPr id="7" name="TextBox 6"/>
-          <p:cNvSpPr txBox="1"/>
-          <p:nvPr/>
-        </p:nvSpPr>
-        <p:spPr>
-          <a:xfrm>
-            <a:off x="3765221" y="1883593"/>
-            <a:ext cx="7937098" cy="3170099"/>
-          </a:xfrm>
-          <a:prstGeom prst="rect">
-            <a:avLst/>
-          </a:prstGeom>
-          <a:noFill/>
-        </p:spPr>
-        <p:txBody>
-          <a:bodyPr wrap="square" rtlCol="0">
-            <a:spAutoFit/>
-          </a:bodyPr>
-          <a:lstStyle/>
-          <a:p>
-            <a:r>
-              <a:rPr lang="en-US" sz="2000" b="1" dirty="0" smtClean="0">
-                <a:latin typeface="Cambria" panose="02040503050406030204" pitchFamily="18" charset="0"/>
-              </a:rPr>
-              <a:t>Just because you can run a ruby gem on your server doesn’t mean Node.js can find it - Andrew</a:t>
-            </a:r>
-          </a:p>
-          <a:p>
-            <a:endParaRPr lang="en-US" sz="2000" b="1" dirty="0">
-              <a:latin typeface="Cambria" panose="02040503050406030204" pitchFamily="18" charset="0"/>
-            </a:endParaRPr>
-          </a:p>
-          <a:p>
-            <a:r>
-              <a:rPr lang="en-US" sz="2000" b="1" dirty="0" smtClean="0">
-                <a:latin typeface="Cambria" panose="02040503050406030204" pitchFamily="18" charset="0"/>
-              </a:rPr>
-              <a:t>Shell Scripting! – Luc</a:t>
-            </a:r>
-          </a:p>
-          <a:p>
-            <a:endParaRPr lang="en-US" sz="2000" b="1" dirty="0">
-              <a:latin typeface="Cambria" panose="02040503050406030204" pitchFamily="18" charset="0"/>
-            </a:endParaRPr>
-          </a:p>
-          <a:p>
-            <a:r>
-              <a:rPr lang="en-US" sz="2000" b="1" dirty="0" err="1" smtClean="0">
-                <a:latin typeface="Cambria" panose="02040503050406030204" pitchFamily="18" charset="0"/>
-              </a:rPr>
-              <a:t>OpenStudio</a:t>
-            </a:r>
-            <a:r>
-              <a:rPr lang="en-US" sz="2000" b="1" dirty="0" smtClean="0">
-                <a:latin typeface="Cambria" panose="02040503050406030204" pitchFamily="18" charset="0"/>
-              </a:rPr>
-              <a:t> Command Line Interface and Node.js - Matt </a:t>
-            </a:r>
-          </a:p>
-          <a:p>
-            <a:endParaRPr lang="en-US" sz="2000" b="1" dirty="0">
-              <a:latin typeface="Cambria" panose="02040503050406030204" pitchFamily="18" charset="0"/>
-            </a:endParaRPr>
-          </a:p>
-          <a:p>
-            <a:endParaRPr lang="en-US" sz="2000" b="1" dirty="0" smtClean="0">
-              <a:latin typeface="Cambria" panose="02040503050406030204" pitchFamily="18" charset="0"/>
-            </a:endParaRPr>
-          </a:p>
-          <a:p>
-            <a:endParaRPr lang="en-US" sz="2000" b="1" dirty="0" smtClean="0">
-              <a:latin typeface="Cambria" panose="02040503050406030204" pitchFamily="18" charset="0"/>
-            </a:endParaRPr>
-          </a:p>
-          <a:p>
-            <a:endParaRPr lang="en-US" sz="2000" b="1" dirty="0" smtClean="0">
-              <a:latin typeface="Cambria" panose="02040503050406030204" pitchFamily="18" charset="0"/>
-            </a:endParaRPr>
-          </a:p>
-        </p:txBody>
-      </p:sp>
-      <p:pic>
-        <p:nvPicPr>
-          <p:cNvPr id="8" name="Picture 7"/>
-          <p:cNvPicPr>
-            <a:picLocks noChangeAspect="1"/>
-          </p:cNvPicPr>
-          <p:nvPr/>
-        </p:nvPicPr>
-        <p:blipFill>
-          <a:blip r:embed="rId2"/>
-          <a:stretch>
-            <a:fillRect/>
-          </a:stretch>
-        </p:blipFill>
-        <p:spPr>
-          <a:xfrm rot="2732641">
-            <a:off x="3009191" y="2505038"/>
-            <a:ext cx="626332" cy="626332"/>
-          </a:xfrm>
-          <a:prstGeom prst="rect">
-            <a:avLst/>
-          </a:prstGeom>
-        </p:spPr>
-      </p:pic>
-      <p:pic>
-        <p:nvPicPr>
-          <p:cNvPr id="9" name="Picture 8"/>
-          <p:cNvPicPr>
-            <a:picLocks noChangeAspect="1"/>
-          </p:cNvPicPr>
-          <p:nvPr/>
-        </p:nvPicPr>
-        <p:blipFill>
-          <a:blip r:embed="rId2"/>
-          <a:stretch>
-            <a:fillRect/>
-          </a:stretch>
-        </p:blipFill>
-        <p:spPr>
-          <a:xfrm rot="2732641">
-            <a:off x="3011868" y="3161598"/>
-            <a:ext cx="626332" cy="626332"/>
-          </a:xfrm>
-          <a:prstGeom prst="rect">
-            <a:avLst/>
-          </a:prstGeom>
-        </p:spPr>
-      </p:pic>
-      <p:pic>
-        <p:nvPicPr>
-          <p:cNvPr id="10" name="Picture 9"/>
-          <p:cNvPicPr>
-            <a:picLocks noChangeAspect="1"/>
-          </p:cNvPicPr>
-          <p:nvPr/>
-        </p:nvPicPr>
-        <p:blipFill>
-          <a:blip r:embed="rId2"/>
-          <a:stretch>
-            <a:fillRect/>
-          </a:stretch>
-        </p:blipFill>
-        <p:spPr>
-          <a:xfrm rot="2732641">
-            <a:off x="2967653" y="3886637"/>
-            <a:ext cx="626332" cy="626332"/>
-          </a:xfrm>
-          <a:prstGeom prst="rect">
-            <a:avLst/>
-          </a:prstGeom>
-        </p:spPr>
-      </p:pic>
-      <p:pic>
-        <p:nvPicPr>
-          <p:cNvPr id="11" name="Picture 10"/>
-          <p:cNvPicPr>
-            <a:picLocks noChangeAspect="1"/>
-          </p:cNvPicPr>
-          <p:nvPr/>
-        </p:nvPicPr>
-        <p:blipFill>
-          <a:blip r:embed="rId2"/>
-          <a:stretch>
-            <a:fillRect/>
-          </a:stretch>
-        </p:blipFill>
-        <p:spPr>
-          <a:xfrm rot="2732641">
-            <a:off x="2962299" y="4543200"/>
-            <a:ext cx="626332" cy="626332"/>
-          </a:xfrm>
-          <a:prstGeom prst="rect">
-            <a:avLst/>
-          </a:prstGeom>
-        </p:spPr>
-      </p:pic>
-      <p:pic>
-        <p:nvPicPr>
-          <p:cNvPr id="12" name="Picture 11"/>
-          <p:cNvPicPr>
-            <a:picLocks noChangeAspect="1"/>
-          </p:cNvPicPr>
-          <p:nvPr/>
-        </p:nvPicPr>
-        <p:blipFill>
-          <a:blip r:embed="rId2"/>
-          <a:stretch>
-            <a:fillRect/>
-          </a:stretch>
-        </p:blipFill>
-        <p:spPr>
-          <a:xfrm rot="2732641">
-            <a:off x="2964976" y="5199760"/>
-            <a:ext cx="626332" cy="626332"/>
-          </a:xfrm>
-          <a:prstGeom prst="rect">
-            <a:avLst/>
-          </a:prstGeom>
-        </p:spPr>
-      </p:pic>
-    </p:spTree>
-    <p:extLst>
-      <p:ext uri="{BB962C8B-B14F-4D97-AF65-F5344CB8AC3E}">
-        <p14:creationId xmlns:p14="http://schemas.microsoft.com/office/powerpoint/2010/main" val="1383050334"/>
-      </p:ext>
-    </p:extLst>
-  </p:cSld>
-  <p:clrMapOvr>
-    <a:masterClrMapping/>
-  </p:clrMapOvr>
-  <p:timing>
-    <p:tnLst>
-      <p:par>
-        <p:cTn id="1" dur="indefinite" restart="never" nodeType="tmRoot"/>
-      </p:par>
-    </p:tnLst>
-  </p:timing>
-</p:sld>
-</file>
-
-<file path=ppt/slides/slide8.xml><?xml version="1.0" encoding="utf-8"?>
-<p:sld xmlns:a="http://schemas.openxmlformats.org/drawingml/2006/main" xmlns:r="http://schemas.openxmlformats.org/officeDocument/2006/relationships" xmlns:p="http://schemas.openxmlformats.org/presentationml/2006/main">
-  <p:cSld>
-    <p:spTree>
-      <p:nvGrpSpPr>
-        <p:cNvPr id="1" name=""/>
-        <p:cNvGrpSpPr/>
-        <p:nvPr/>
-      </p:nvGrpSpPr>
-      <p:grpSpPr>
-        <a:xfrm>
-          <a:off x="0" y="0"/>
-          <a:ext cx="0" cy="0"/>
-          <a:chOff x="0" y="0"/>
-          <a:chExt cx="0" cy="0"/>
-        </a:xfrm>
-      </p:grpSpPr>
-      <p:pic>
-        <p:nvPicPr>
-          <p:cNvPr id="4" name="Picture 3"/>
-          <p:cNvPicPr>
-            <a:picLocks noChangeAspect="1"/>
-          </p:cNvPicPr>
-          <p:nvPr/>
-        </p:nvPicPr>
-        <p:blipFill>
-          <a:blip r:embed="rId2"/>
-          <a:stretch>
-            <a:fillRect/>
-          </a:stretch>
-        </p:blipFill>
-        <p:spPr>
-          <a:xfrm rot="2732641">
-            <a:off x="1670100" y="1242369"/>
-            <a:ext cx="1334399" cy="1334399"/>
-          </a:xfrm>
-          <a:prstGeom prst="rect">
-            <a:avLst/>
-          </a:prstGeom>
-        </p:spPr>
-      </p:pic>
-      <p:pic>
-        <p:nvPicPr>
-          <p:cNvPr id="1026" name="Picture 2" descr="https://d30y9cdsu7xlg0.cloudfront.net/png/9414-200.png"/>
-          <p:cNvPicPr>
-            <a:picLocks noChangeAspect="1" noChangeArrowheads="1"/>
-          </p:cNvPicPr>
-          <p:nvPr/>
-        </p:nvPicPr>
-        <p:blipFill>
-          <a:blip r:embed="rId3">
-            <a:extLst>
-              <a:ext uri="{28A0092B-C50C-407E-A947-70E740481C1C}">
-                <a14:useLocalDpi xmlns:a14="http://schemas.microsoft.com/office/drawing/2010/main" val="0"/>
-              </a:ext>
-            </a:extLst>
-          </a:blip>
-          <a:srcRect/>
-          <a:stretch>
-            <a:fillRect/>
-          </a:stretch>
-        </p:blipFill>
-        <p:spPr bwMode="auto">
-          <a:xfrm>
-            <a:off x="268267" y="296057"/>
-            <a:ext cx="1905000" cy="1905000"/>
-          </a:xfrm>
-          <a:prstGeom prst="rect">
-            <a:avLst/>
-          </a:prstGeom>
-          <a:noFill/>
-          <a:extLst>
-            <a:ext uri="{909E8E84-426E-40DD-AFC4-6F175D3DCCD1}">
-              <a14:hiddenFill xmlns:a14="http://schemas.microsoft.com/office/drawing/2010/main">
-                <a:solidFill>
-                  <a:srgbClr val="FFFFFF"/>
-                </a:solidFill>
-              </a14:hiddenFill>
-            </a:ext>
-          </a:extLst>
-        </p:spPr>
-      </p:pic>
-      <p:sp>
-        <p:nvSpPr>
-          <p:cNvPr id="5" name="TextBox 4"/>
-          <p:cNvSpPr txBox="1"/>
-          <p:nvPr/>
-        </p:nvSpPr>
-        <p:spPr>
-          <a:xfrm>
-            <a:off x="2879493" y="458216"/>
-            <a:ext cx="7937098" cy="1015663"/>
-          </a:xfrm>
-          <a:prstGeom prst="rect">
-            <a:avLst/>
-          </a:prstGeom>
-          <a:noFill/>
-        </p:spPr>
-        <p:txBody>
-          <a:bodyPr wrap="square" rtlCol="0">
-            <a:spAutoFit/>
-          </a:bodyPr>
-          <a:lstStyle/>
-          <a:p>
-            <a:r>
-              <a:rPr lang="en-US" sz="6000" b="1" dirty="0" smtClean="0">
-                <a:latin typeface="Cambria" panose="02040503050406030204" pitchFamily="18" charset="0"/>
-              </a:rPr>
-              <a:t>Next Steps:</a:t>
-            </a:r>
-          </a:p>
-        </p:txBody>
-      </p:sp>
-      <p:pic>
-        <p:nvPicPr>
-          <p:cNvPr id="6" name="Picture 5"/>
-          <p:cNvPicPr>
-            <a:picLocks noChangeAspect="1"/>
-          </p:cNvPicPr>
-          <p:nvPr/>
-        </p:nvPicPr>
-        <p:blipFill>
-          <a:blip r:embed="rId2"/>
-          <a:stretch>
-            <a:fillRect/>
-          </a:stretch>
-        </p:blipFill>
-        <p:spPr>
-          <a:xfrm rot="2732641">
-            <a:off x="3014545" y="1848475"/>
-            <a:ext cx="626332" cy="626332"/>
-          </a:xfrm>
-          <a:prstGeom prst="rect">
-            <a:avLst/>
-          </a:prstGeom>
-        </p:spPr>
-      </p:pic>
-      <p:sp>
-        <p:nvSpPr>
-          <p:cNvPr id="7" name="TextBox 6"/>
-          <p:cNvSpPr txBox="1"/>
-          <p:nvPr/>
-        </p:nvSpPr>
-        <p:spPr>
-          <a:xfrm>
-            <a:off x="3765221" y="1883593"/>
-            <a:ext cx="7937098" cy="2246769"/>
-          </a:xfrm>
-          <a:prstGeom prst="rect">
-            <a:avLst/>
-          </a:prstGeom>
-          <a:noFill/>
-        </p:spPr>
-        <p:txBody>
-          <a:bodyPr wrap="square" rtlCol="0">
-            <a:spAutoFit/>
-          </a:bodyPr>
-          <a:lstStyle/>
-          <a:p>
-            <a:r>
-              <a:rPr lang="en-US" sz="2000" b="1" dirty="0" smtClean="0">
-                <a:latin typeface="Cambria" panose="02040503050406030204" pitchFamily="18" charset="0"/>
-              </a:rPr>
-              <a:t>Enable as local service</a:t>
-            </a:r>
-          </a:p>
-          <a:p>
-            <a:endParaRPr lang="en-US" sz="2000" b="1" dirty="0">
-              <a:latin typeface="Cambria" panose="02040503050406030204" pitchFamily="18" charset="0"/>
-            </a:endParaRPr>
-          </a:p>
-          <a:p>
-            <a:r>
-              <a:rPr lang="en-US" sz="2000" b="1" dirty="0" smtClean="0">
-                <a:latin typeface="Cambria" panose="02040503050406030204" pitchFamily="18" charset="0"/>
-              </a:rPr>
-              <a:t>This can be extended to run more than diffs on files, e.g. run </a:t>
-            </a:r>
-            <a:r>
-              <a:rPr lang="en-US" sz="2000" b="1" dirty="0" err="1" smtClean="0">
-                <a:latin typeface="Cambria" panose="02040503050406030204" pitchFamily="18" charset="0"/>
-              </a:rPr>
-              <a:t>openstudio</a:t>
-            </a:r>
-            <a:r>
-              <a:rPr lang="en-US" sz="2000" b="1" dirty="0">
-                <a:latin typeface="Cambria" panose="02040503050406030204" pitchFamily="18" charset="0"/>
-              </a:rPr>
-              <a:t> </a:t>
-            </a:r>
-            <a:r>
-              <a:rPr lang="en-US" sz="2000" b="1" dirty="0" smtClean="0">
-                <a:latin typeface="Cambria" panose="02040503050406030204" pitchFamily="18" charset="0"/>
-              </a:rPr>
-              <a:t>models and report energy use differences</a:t>
-            </a:r>
-            <a:endParaRPr lang="en-US" sz="2000" b="1" dirty="0">
-              <a:latin typeface="Cambria" panose="02040503050406030204" pitchFamily="18" charset="0"/>
-            </a:endParaRPr>
-          </a:p>
-          <a:p>
-            <a:endParaRPr lang="en-US" sz="2000" b="1" dirty="0" smtClean="0">
-              <a:latin typeface="Cambria" panose="02040503050406030204" pitchFamily="18" charset="0"/>
-            </a:endParaRPr>
-          </a:p>
-          <a:p>
-            <a:endParaRPr lang="en-US" sz="2000" b="1" dirty="0" smtClean="0">
-              <a:latin typeface="Cambria" panose="02040503050406030204" pitchFamily="18" charset="0"/>
-            </a:endParaRPr>
-          </a:p>
-          <a:p>
-            <a:endParaRPr lang="en-US" sz="2000" b="1" dirty="0" smtClean="0">
-              <a:latin typeface="Cambria" panose="02040503050406030204" pitchFamily="18" charset="0"/>
-            </a:endParaRPr>
-          </a:p>
-        </p:txBody>
-      </p:sp>
-      <p:pic>
-        <p:nvPicPr>
-          <p:cNvPr id="8" name="Picture 7"/>
-          <p:cNvPicPr>
-            <a:picLocks noChangeAspect="1"/>
-          </p:cNvPicPr>
-          <p:nvPr/>
-        </p:nvPicPr>
-        <p:blipFill>
-          <a:blip r:embed="rId2"/>
-          <a:stretch>
-            <a:fillRect/>
-          </a:stretch>
-        </p:blipFill>
-        <p:spPr>
-          <a:xfrm rot="2732641">
-            <a:off x="3009191" y="2505038"/>
-            <a:ext cx="626332" cy="626332"/>
-          </a:xfrm>
-          <a:prstGeom prst="rect">
-            <a:avLst/>
-          </a:prstGeom>
-        </p:spPr>
-      </p:pic>
-      <p:pic>
-        <p:nvPicPr>
-          <p:cNvPr id="9" name="Picture 8"/>
-          <p:cNvPicPr>
-            <a:picLocks noChangeAspect="1"/>
-          </p:cNvPicPr>
-          <p:nvPr/>
-        </p:nvPicPr>
-        <p:blipFill>
-          <a:blip r:embed="rId2"/>
-          <a:stretch>
-            <a:fillRect/>
-          </a:stretch>
-        </p:blipFill>
-        <p:spPr>
-          <a:xfrm rot="2732641">
-            <a:off x="3011868" y="3161598"/>
-            <a:ext cx="626332" cy="626332"/>
-          </a:xfrm>
-          <a:prstGeom prst="rect">
-            <a:avLst/>
-          </a:prstGeom>
-        </p:spPr>
-      </p:pic>
-      <p:pic>
-        <p:nvPicPr>
-          <p:cNvPr id="10" name="Picture 9"/>
-          <p:cNvPicPr>
-            <a:picLocks noChangeAspect="1"/>
-          </p:cNvPicPr>
-          <p:nvPr/>
-        </p:nvPicPr>
-        <p:blipFill>
-          <a:blip r:embed="rId2"/>
-          <a:stretch>
-            <a:fillRect/>
-          </a:stretch>
-        </p:blipFill>
-        <p:spPr>
-          <a:xfrm rot="2732641">
-            <a:off x="2967653" y="3886637"/>
-            <a:ext cx="626332" cy="626332"/>
-          </a:xfrm>
-          <a:prstGeom prst="rect">
-            <a:avLst/>
-          </a:prstGeom>
-        </p:spPr>
-      </p:pic>
-      <p:pic>
-        <p:nvPicPr>
-          <p:cNvPr id="11" name="Picture 10"/>
-          <p:cNvPicPr>
-            <a:picLocks noChangeAspect="1"/>
-          </p:cNvPicPr>
-          <p:nvPr/>
-        </p:nvPicPr>
-        <p:blipFill>
-          <a:blip r:embed="rId2"/>
-          <a:stretch>
-            <a:fillRect/>
-          </a:stretch>
-        </p:blipFill>
-        <p:spPr>
-          <a:xfrm rot="2732641">
-            <a:off x="2962299" y="4543200"/>
-            <a:ext cx="626332" cy="626332"/>
-          </a:xfrm>
-          <a:prstGeom prst="rect">
-            <a:avLst/>
-          </a:prstGeom>
-        </p:spPr>
-      </p:pic>
-      <p:pic>
-        <p:nvPicPr>
-          <p:cNvPr id="12" name="Picture 11"/>
-          <p:cNvPicPr>
-            <a:picLocks noChangeAspect="1"/>
-          </p:cNvPicPr>
-          <p:nvPr/>
-        </p:nvPicPr>
-        <p:blipFill>
-          <a:blip r:embed="rId2"/>
-          <a:stretch>
-            <a:fillRect/>
-          </a:stretch>
-        </p:blipFill>
-        <p:spPr>
-          <a:xfrm rot="2732641">
-            <a:off x="2964976" y="5199760"/>
-            <a:ext cx="626332" cy="626332"/>
-          </a:xfrm>
-          <a:prstGeom prst="rect">
-            <a:avLst/>
-          </a:prstGeom>
-        </p:spPr>
-      </p:pic>
-    </p:spTree>
-    <p:extLst>
-      <p:ext uri="{BB962C8B-B14F-4D97-AF65-F5344CB8AC3E}">
-        <p14:creationId xmlns:p14="http://schemas.microsoft.com/office/powerpoint/2010/main" val="2083896037"/>
       </p:ext>
     </p:extLst>
   </p:cSld>

</xml_diff>